<commit_message>
Added presentation #2 to documents table Changed presentation #1 to read-only
</commit_message>
<xml_diff>
--- a/docs/presentation_1.pptx
+++ b/docs/presentation_1.pptx
@@ -113,20 +113,6 @@
     </a:lvl9pPr>
   </p:defaultTextStyle>
   <p:extLst>
-    <p:ext uri="{521415D9-36F7-43E2-AB2F-B90AF26B5E84}">
-      <p14:sectionLst xmlns:p14="http://schemas.microsoft.com/office/powerpoint/2010/main">
-        <p14:section name="Secção Predefinida" id="{29ECFAA0-F8E1-4450-932B-1389A2FB37C1}">
-          <p14:sldIdLst>
-            <p14:sldId id="256"/>
-            <p14:sldId id="257"/>
-            <p14:sldId id="258"/>
-            <p14:sldId id="259"/>
-            <p14:sldId id="261"/>
-            <p14:sldId id="263"/>
-          </p14:sldIdLst>
-        </p14:section>
-      </p14:sectionLst>
-    </p:ext>
     <p:ext uri="{EFAFB233-063F-42B5-8137-9DF3F51BA10A}">
       <p15:sldGuideLst xmlns:p15="http://schemas.microsoft.com/office/powerpoint/2012/main"/>
     </p:ext>
@@ -216,7 +202,7 @@
           <a:p>
             <a:fld id="{932BE1EC-D98D-4021-8D8A-3682E6BCC228}" type="datetimeFigureOut">
               <a:rPr lang="pt-PT" smtClean="0"/>
-              <a:t>03/11/2021</a:t>
+              <a:t>06/01/2022</a:t>
             </a:fld>
             <a:endParaRPr lang="pt-PT"/>
           </a:p>
@@ -1212,7 +1198,7 @@
           <a:p>
             <a:fld id="{3F16B491-F5B1-48F3-90C7-09CFADEAECE0}" type="datetimeFigureOut">
               <a:rPr lang="pt-PT" smtClean="0"/>
-              <a:t>03/11/2021</a:t>
+              <a:t>06/01/2022</a:t>
             </a:fld>
             <a:endParaRPr lang="pt-PT"/>
           </a:p>
@@ -1410,7 +1396,7 @@
           <a:p>
             <a:fld id="{3F16B491-F5B1-48F3-90C7-09CFADEAECE0}" type="datetimeFigureOut">
               <a:rPr lang="pt-PT" smtClean="0"/>
-              <a:t>03/11/2021</a:t>
+              <a:t>06/01/2022</a:t>
             </a:fld>
             <a:endParaRPr lang="pt-PT"/>
           </a:p>
@@ -1618,7 +1604,7 @@
           <a:p>
             <a:fld id="{3F16B491-F5B1-48F3-90C7-09CFADEAECE0}" type="datetimeFigureOut">
               <a:rPr lang="pt-PT" smtClean="0"/>
-              <a:t>03/11/2021</a:t>
+              <a:t>06/01/2022</a:t>
             </a:fld>
             <a:endParaRPr lang="pt-PT"/>
           </a:p>
@@ -1816,7 +1802,7 @@
           <a:p>
             <a:fld id="{3F16B491-F5B1-48F3-90C7-09CFADEAECE0}" type="datetimeFigureOut">
               <a:rPr lang="pt-PT" smtClean="0"/>
-              <a:t>03/11/2021</a:t>
+              <a:t>06/01/2022</a:t>
             </a:fld>
             <a:endParaRPr lang="pt-PT"/>
           </a:p>
@@ -2091,7 +2077,7 @@
           <a:p>
             <a:fld id="{3F16B491-F5B1-48F3-90C7-09CFADEAECE0}" type="datetimeFigureOut">
               <a:rPr lang="pt-PT" smtClean="0"/>
-              <a:t>03/11/2021</a:t>
+              <a:t>06/01/2022</a:t>
             </a:fld>
             <a:endParaRPr lang="pt-PT"/>
           </a:p>
@@ -2356,7 +2342,7 @@
           <a:p>
             <a:fld id="{3F16B491-F5B1-48F3-90C7-09CFADEAECE0}" type="datetimeFigureOut">
               <a:rPr lang="pt-PT" smtClean="0"/>
-              <a:t>03/11/2021</a:t>
+              <a:t>06/01/2022</a:t>
             </a:fld>
             <a:endParaRPr lang="pt-PT"/>
           </a:p>
@@ -2768,7 +2754,7 @@
           <a:p>
             <a:fld id="{3F16B491-F5B1-48F3-90C7-09CFADEAECE0}" type="datetimeFigureOut">
               <a:rPr lang="pt-PT" smtClean="0"/>
-              <a:t>03/11/2021</a:t>
+              <a:t>06/01/2022</a:t>
             </a:fld>
             <a:endParaRPr lang="pt-PT"/>
           </a:p>
@@ -2909,7 +2895,7 @@
           <a:p>
             <a:fld id="{3F16B491-F5B1-48F3-90C7-09CFADEAECE0}" type="datetimeFigureOut">
               <a:rPr lang="pt-PT" smtClean="0"/>
-              <a:t>03/11/2021</a:t>
+              <a:t>06/01/2022</a:t>
             </a:fld>
             <a:endParaRPr lang="pt-PT"/>
           </a:p>
@@ -3022,7 +3008,7 @@
           <a:p>
             <a:fld id="{3F16B491-F5B1-48F3-90C7-09CFADEAECE0}" type="datetimeFigureOut">
               <a:rPr lang="pt-PT" smtClean="0"/>
-              <a:t>03/11/2021</a:t>
+              <a:t>06/01/2022</a:t>
             </a:fld>
             <a:endParaRPr lang="pt-PT"/>
           </a:p>
@@ -3333,7 +3319,7 @@
           <a:p>
             <a:fld id="{3F16B491-F5B1-48F3-90C7-09CFADEAECE0}" type="datetimeFigureOut">
               <a:rPr lang="pt-PT" smtClean="0"/>
-              <a:t>03/11/2021</a:t>
+              <a:t>06/01/2022</a:t>
             </a:fld>
             <a:endParaRPr lang="pt-PT"/>
           </a:p>
@@ -3621,7 +3607,7 @@
           <a:p>
             <a:fld id="{3F16B491-F5B1-48F3-90C7-09CFADEAECE0}" type="datetimeFigureOut">
               <a:rPr lang="pt-PT" smtClean="0"/>
-              <a:t>03/11/2021</a:t>
+              <a:t>06/01/2022</a:t>
             </a:fld>
             <a:endParaRPr lang="pt-PT"/>
           </a:p>
@@ -3862,7 +3848,7 @@
           <a:p>
             <a:fld id="{3F16B491-F5B1-48F3-90C7-09CFADEAECE0}" type="datetimeFigureOut">
               <a:rPr lang="pt-PT" smtClean="0"/>
-              <a:t>03/11/2021</a:t>
+              <a:t>06/01/2022</a:t>
             </a:fld>
             <a:endParaRPr lang="pt-PT"/>
           </a:p>

</xml_diff>